<commit_message>
Final slides for week 3?
</commit_message>
<xml_diff>
--- a/FiveEasyPieces3.pptx
+++ b/FiveEasyPieces3.pptx
@@ -5479,7 +5479,7 @@
             <p:ph idx="1"/>
             <p:extLst>
               <p:ext uri="{D42A27DB-BD31-4B8C-83A1-F6EECF244321}">
-                <p14:modId xmlns:p14="http://schemas.microsoft.com/office/powerpoint/2010/main" val="525490626"/>
+                <p14:modId xmlns:p14="http://schemas.microsoft.com/office/powerpoint/2010/main" val="3407490095"/>
               </p:ext>
             </p:extLst>
           </p:nvPr>
@@ -5929,7 +5929,7 @@
                             <a:srgbClr val="FFFF00"/>
                           </a:solidFill>
                         </a:rPr>
-                        <a:t>Skip Even Divisors</a:t>
+                        <a:t>Skip Multiples of 2</a:t>
                       </a:r>
                       <a:endParaRPr lang="en-US" dirty="0">
                         <a:ln>
@@ -6344,7 +6344,7 @@
                             <a:srgbClr val="FFFF00"/>
                           </a:solidFill>
                         </a:rPr>
-                        <a:t> of 3 &amp; 5</a:t>
+                        <a:t> of 2 &amp; 3</a:t>
                       </a:r>
                       <a:endParaRPr lang="en-US" dirty="0">
                         <a:ln>
@@ -6546,10 +6546,10 @@
                             <a:srgbClr val="FFFF00"/>
                           </a:solidFill>
                         </a:rPr>
-                        <a:t>Skip Multiples of 3, 5, &amp;</a:t>
+                        <a:t>Skip Multiples </a:t>
                       </a:r>
                       <a:r>
-                        <a:rPr lang="en-US" baseline="0" dirty="0" smtClean="0">
+                        <a:rPr lang="en-US" smtClean="0">
                           <a:ln>
                             <a:noFill/>
                           </a:ln>
@@ -6557,7 +6557,7 @@
                             <a:srgbClr val="FFFF00"/>
                           </a:solidFill>
                         </a:rPr>
-                        <a:t> 7</a:t>
+                        <a:t>of 2, 3 &amp; 5</a:t>
                       </a:r>
                       <a:endParaRPr lang="en-US" dirty="0">
                         <a:ln>
@@ -9740,7 +9740,7 @@
           <a:p>
             <a:r>
               <a:rPr lang="en-US" dirty="0" smtClean="0"/>
-              <a:t>Skipping Multiples of 3 And 5</a:t>
+              <a:t>Skipping Multiples of 2 And 3</a:t>
             </a:r>
             <a:endParaRPr lang="en-US" dirty="0" smtClean="0"/>
           </a:p>
@@ -10392,7 +10392,7 @@
           <a:p>
             <a:r>
               <a:rPr lang="en-US" dirty="0" smtClean="0"/>
-              <a:t>Skipping Multiples of 3, 5, and 7</a:t>
+              <a:t>Skipping Multiples of 2, 3, and 5</a:t>
             </a:r>
             <a:endParaRPr lang="en-US" dirty="0" smtClean="0"/>
           </a:p>

</xml_diff>